<commit_message>
update lab 1 and lecture 0
</commit_message>
<xml_diff>
--- a/lectures/lec0/Lec0-CourseMechanisms.pptx
+++ b/lectures/lec0/Lec0-CourseMechanisms.pptx
@@ -313,7 +313,7 @@
             <a:fld id="{F33530C9-BF13-40EE-A1EC-EBBB0134EBBA}" type="datetime1">
               <a:rPr lang="en-US"/>
               <a:pPr/>
-              <a:t>8/22/2015</a:t>
+              <a:t>9/10/2015 Thursday</a:t>
             </a:fld>
             <a:endParaRPr lang="en-US"/>
           </a:p>
@@ -531,7 +531,7 @@
             <a:fld id="{7DD20F8F-B3A0-465C-A2C5-4272F8BE0711}" type="datetime1">
               <a:rPr lang="en-US"/>
               <a:pPr/>
-              <a:t>8/22/2015</a:t>
+              <a:t>9/10/2015 Thursday</a:t>
             </a:fld>
             <a:endParaRPr lang="en-US"/>
           </a:p>
@@ -930,7 +930,7 @@
             <a:fld id="{7DD20F8F-B3A0-465C-A2C5-4272F8BE0711}" type="datetime1">
               <a:rPr lang="en-US" smtClean="0"/>
               <a:pPr/>
-              <a:t>8/22/2015</a:t>
+              <a:t>9/10/2015 Thursday</a:t>
             </a:fld>
             <a:endParaRPr lang="en-US"/>
           </a:p>
@@ -1041,7 +1041,7 @@
             <a:fld id="{7DD20F8F-B3A0-465C-A2C5-4272F8BE0711}" type="datetime1">
               <a:rPr lang="en-US" smtClean="0"/>
               <a:pPr/>
-              <a:t>8/22/2015</a:t>
+              <a:t>9/10/2015 Thursday</a:t>
             </a:fld>
             <a:endParaRPr lang="en-US"/>
           </a:p>
@@ -1154,7 +1154,7 @@
             <a:fld id="{7DD20F8F-B3A0-465C-A2C5-4272F8BE0711}" type="datetime1">
               <a:rPr lang="en-US" smtClean="0"/>
               <a:pPr/>
-              <a:t>8/22/2015</a:t>
+              <a:t>9/10/2015 Thursday</a:t>
             </a:fld>
             <a:endParaRPr lang="en-US"/>
           </a:p>
@@ -5968,8 +5968,8 @@
           </a:p>
         </p:txBody>
       </p:sp>
-      <mc:AlternateContent xmlns:mc="http://schemas.openxmlformats.org/markup-compatibility/2006">
-        <mc:Choice xmlns:a14="http://schemas.microsoft.com/office/drawing/2010/main" Requires="a14">
+      <mc:AlternateContent xmlns:mc="http://schemas.openxmlformats.org/markup-compatibility/2006" xmlns:a14="http://schemas.microsoft.com/office/drawing/2010/main">
+        <mc:Choice Requires="a14">
           <p:sp>
             <p:nvSpPr>
               <p:cNvPr id="3" name="Text Placeholder 2"/>
@@ -6656,7 +6656,7 @@
             </p:txBody>
           </p:sp>
         </mc:Choice>
-        <mc:Fallback>
+        <mc:Fallback xmlns="">
           <p:sp>
             <p:nvSpPr>
               <p:cNvPr id="3" name="Text Placeholder 2"/>
@@ -6774,15 +6774,7 @@
             </a:pPr>
             <a:r>
               <a:rPr lang="en-US" dirty="0" smtClean="0"/>
-              <a:t> Quarter 1 </a:t>
-            </a:r>
-            <a:r>
-              <a:rPr lang="en-US" dirty="0" smtClean="0"/>
-              <a:t>(36 pts</a:t>
-            </a:r>
-            <a:r>
-              <a:rPr lang="en-US" dirty="0" smtClean="0"/>
-              <a:t>) </a:t>
+              <a:t> Quarter 1 (36 pts) </a:t>
             </a:r>
           </a:p>
           <a:p>
@@ -6793,11 +6785,7 @@
             </a:pPr>
             <a:r>
               <a:rPr lang="en-US" dirty="0" smtClean="0"/>
-              <a:t>Lab </a:t>
-            </a:r>
-            <a:r>
-              <a:rPr lang="en-US" dirty="0" smtClean="0"/>
-              <a:t>reports (6x 4pts)</a:t>
+              <a:t>Lab reports (6x 4pts)</a:t>
             </a:r>
           </a:p>
           <a:p>
@@ -6821,7 +6809,6 @@
               <a:rPr lang="en-US" b="0" dirty="0" smtClean="0"/>
               <a:t>PCB test reports (3x 2pts)</a:t>
             </a:r>
-            <a:endParaRPr lang="en-US" b="0" dirty="0" smtClean="0"/>
           </a:p>
           <a:p>
             <a:pPr>
@@ -6831,15 +6818,7 @@
             </a:pPr>
             <a:r>
               <a:rPr lang="en-US" dirty="0" smtClean="0"/>
-              <a:t> Quarter 2 (</a:t>
-            </a:r>
-            <a:r>
-              <a:rPr lang="en-US" dirty="0" smtClean="0"/>
-              <a:t>40 </a:t>
-            </a:r>
-            <a:r>
-              <a:rPr lang="en-US" dirty="0" smtClean="0"/>
-              <a:t>pts)</a:t>
+              <a:t> Quarter 2 (40 pts)</a:t>
             </a:r>
           </a:p>
           <a:p>
@@ -6902,15 +6881,7 @@
           <a:p>
             <a:r>
               <a:rPr lang="en-US" dirty="0" smtClean="0"/>
-              <a:t>Participation </a:t>
-            </a:r>
-            <a:r>
-              <a:rPr lang="en-US" dirty="0" smtClean="0"/>
-              <a:t>(9 </a:t>
-            </a:r>
-            <a:r>
-              <a:rPr lang="en-US" dirty="0" smtClean="0"/>
-              <a:t>pts)</a:t>
+              <a:t>Participation (9 pts)</a:t>
             </a:r>
           </a:p>
           <a:p>
@@ -6940,13 +6911,8 @@
             <a:pPr lvl="1"/>
             <a:r>
               <a:rPr lang="en-US" dirty="0" smtClean="0"/>
-              <a:t>Graded by the </a:t>
-            </a:r>
-            <a:r>
-              <a:rPr lang="en-US" dirty="0" smtClean="0"/>
-              <a:t>instructor and TA</a:t>
-            </a:r>
-            <a:endParaRPr lang="en-US" dirty="0" smtClean="0"/>
+              <a:t>Graded by the instructor and TA</a:t>
+            </a:r>
           </a:p>
           <a:p>
             <a:pPr lvl="1"/>
@@ -7851,13 +7817,8 @@
           <a:p>
             <a:r>
               <a:rPr lang="en-US" dirty="0" smtClean="0"/>
-              <a:t>Errors for </a:t>
-            </a:r>
-            <a:r>
-              <a:rPr lang="en-US" dirty="0" smtClean="0"/>
-              <a:t>Bonus!</a:t>
-            </a:r>
-            <a:endParaRPr lang="en-US" dirty="0" smtClean="0"/>
+              <a:t>Errors for Bonus!</a:t>
+            </a:r>
           </a:p>
           <a:p>
             <a:pPr lvl="1"/>
@@ -10104,7 +10065,7 @@
         <p:spPr>
           <a:xfrm>
             <a:off x="304801" y="933262"/>
-            <a:ext cx="4126522" cy="4335463"/>
+            <a:ext cx="4493110" cy="4335463"/>
           </a:xfrm>
         </p:spPr>
         <p:txBody>
@@ -10115,7 +10076,6 @@
               <a:rPr lang="en-US" dirty="0" smtClean="0"/>
               <a:t>Instructor</a:t>
             </a:r>
-            <a:endParaRPr lang="en-US" dirty="0" smtClean="0"/>
           </a:p>
           <a:p>
             <a:pPr lvl="1"/>
@@ -10149,16 +10109,29 @@
             </a:r>
             <a:r>
               <a:rPr lang="en-US" b="1" dirty="0" smtClean="0"/>
-              <a:t>10 AM – 12 PM Monday</a:t>
-            </a:r>
-            <a:r>
-              <a:rPr lang="en-US" dirty="0" smtClean="0"/>
-              <a:t> or </a:t>
+              <a:t>10 AM – 12 PM </a:t>
             </a:r>
             <a:r>
               <a:rPr lang="en-US" b="1" dirty="0" smtClean="0"/>
-              <a:t>by appointment</a:t>
-            </a:r>
+              <a:t>Monday </a:t>
+            </a:r>
+            <a:r>
+              <a:rPr lang="en-US" dirty="0" smtClean="0"/>
+              <a:t>or </a:t>
+            </a:r>
+            <a:r>
+              <a:rPr lang="en-US" b="1" dirty="0" smtClean="0"/>
+              <a:t>by </a:t>
+            </a:r>
+            <a:r>
+              <a:rPr lang="en-US" b="1" dirty="0"/>
+              <a:t>appointment in Kemper 3169</a:t>
+            </a:r>
+            <a:r>
+              <a:rPr lang="en-US" dirty="0"/>
+              <a:t> </a:t>
+            </a:r>
+            <a:endParaRPr lang="en-US" b="1" dirty="0" smtClean="0"/>
           </a:p>
           <a:p>
             <a:r>
@@ -10198,41 +10171,59 @@
             <a:pPr lvl="2"/>
             <a:r>
               <a:rPr lang="en-US" dirty="0" smtClean="0"/>
-              <a:t>Office hours</a:t>
-            </a:r>
-            <a:r>
-              <a:rPr lang="en-US" dirty="0" smtClean="0">
-                <a:solidFill>
-                  <a:srgbClr val="FF0000"/>
-                </a:solidFill>
-              </a:rPr>
-              <a:t>: TBD</a:t>
-            </a:r>
-          </a:p>
-          <a:p>
+              <a:t>Office </a:t>
+            </a:r>
+            <a:r>
+              <a:rPr lang="en-US" dirty="0" smtClean="0"/>
+              <a:t>hours: </a:t>
+            </a:r>
+            <a:r>
+              <a:rPr lang="en-US" b="1" dirty="0"/>
+              <a:t>9:00 – 10:30 AM, Monday &amp; </a:t>
+            </a:r>
+            <a:r>
+              <a:rPr lang="en-US" b="1" dirty="0" smtClean="0"/>
+              <a:t>Tuesday in Kemper 3089</a:t>
+            </a:r>
+            <a:endParaRPr lang="en-US" dirty="0" smtClean="0">
+              <a:solidFill>
+                <a:srgbClr val="FF0000"/>
+              </a:solidFill>
+            </a:endParaRPr>
+          </a:p>
+          <a:p>
+            <a:r>
+              <a:rPr lang="en-US" dirty="0" smtClean="0"/>
+              <a:t>Lecture</a:t>
+            </a:r>
+          </a:p>
+          <a:p>
+            <a:pPr lvl="1"/>
+            <a:r>
+              <a:rPr lang="en-US" b="1" dirty="0" smtClean="0"/>
+              <a:t>1:10 – 2 PM, Friday</a:t>
+            </a:r>
+            <a:r>
+              <a:rPr lang="en-US" dirty="0" smtClean="0"/>
+              <a:t> </a:t>
+            </a:r>
             <a:r>
               <a:rPr lang="en-US" dirty="0"/>
-              <a:t>Lecture</a:t>
-            </a:r>
-          </a:p>
-          <a:p>
-            <a:pPr lvl="1"/>
-            <a:r>
-              <a:rPr lang="en-US" b="1" dirty="0"/>
-              <a:t>10 – 11 AM, Tuesday</a:t>
+              <a:t>in </a:t>
+            </a:r>
+            <a:r>
+              <a:rPr lang="en-US" dirty="0" err="1"/>
+              <a:t>Geidt</a:t>
             </a:r>
             <a:r>
               <a:rPr lang="en-US" dirty="0"/>
-              <a:t> in </a:t>
-            </a:r>
-            <a:r>
-              <a:rPr lang="en-US" dirty="0">
-                <a:solidFill>
-                  <a:srgbClr val="FF0000"/>
-                </a:solidFill>
-              </a:rPr>
-              <a:t>TBD</a:t>
-            </a:r>
+              <a:t> 1007</a:t>
+            </a:r>
+            <a:endParaRPr lang="en-US" dirty="0">
+              <a:solidFill>
+                <a:srgbClr val="FF0000"/>
+              </a:solidFill>
+            </a:endParaRPr>
           </a:p>
           <a:p>
             <a:r>
@@ -10353,6 +10344,88 @@
           </a:extLst>
         </p:spPr>
       </p:pic>
+      <p:sp>
+        <p:nvSpPr>
+          <p:cNvPr id="4" name="TextBox 3"/>
+          <p:cNvSpPr txBox="1"/>
+          <p:nvPr/>
+        </p:nvSpPr>
+        <p:spPr>
+          <a:xfrm>
+            <a:off x="5454652" y="4518480"/>
+            <a:ext cx="2887586" cy="830997"/>
+          </a:xfrm>
+          <a:prstGeom prst="rect">
+            <a:avLst/>
+          </a:prstGeom>
+          <a:noFill/>
+          <a:ln>
+            <a:solidFill>
+              <a:srgbClr val="FF0000"/>
+            </a:solidFill>
+          </a:ln>
+        </p:spPr>
+        <p:txBody>
+          <a:bodyPr wrap="square" rtlCol="0">
+            <a:spAutoFit/>
+          </a:bodyPr>
+          <a:lstStyle/>
+          <a:p>
+            <a:pPr algn="ctr"/>
+            <a:r>
+              <a:rPr lang="en-US" dirty="0" smtClean="0">
+                <a:solidFill>
+                  <a:srgbClr val="FF0000"/>
+                </a:solidFill>
+                <a:latin typeface="+mj-lt"/>
+              </a:rPr>
+              <a:t>Additional </a:t>
+            </a:r>
+            <a:r>
+              <a:rPr lang="en-US" dirty="0">
+                <a:solidFill>
+                  <a:srgbClr val="FF0000"/>
+                </a:solidFill>
+                <a:latin typeface="+mj-lt"/>
+              </a:rPr>
+              <a:t>l</a:t>
+            </a:r>
+            <a:r>
+              <a:rPr lang="en-US" dirty="0" smtClean="0">
+                <a:solidFill>
+                  <a:srgbClr val="FF0000"/>
+                </a:solidFill>
+                <a:latin typeface="+mj-lt"/>
+              </a:rPr>
+              <a:t>ecture time</a:t>
+            </a:r>
+            <a:r>
+              <a:rPr lang="en-US" dirty="0">
+                <a:solidFill>
+                  <a:srgbClr val="FF0000"/>
+                </a:solidFill>
+                <a:latin typeface="+mj-lt"/>
+              </a:rPr>
+              <a:t> </a:t>
+            </a:r>
+            <a:r>
+              <a:rPr lang="en-US" dirty="0" smtClean="0">
+                <a:solidFill>
+                  <a:srgbClr val="FF0000"/>
+                </a:solidFill>
+                <a:latin typeface="+mj-lt"/>
+              </a:rPr>
+              <a:t>needed</a:t>
+            </a:r>
+            <a:endParaRPr lang="en-US" dirty="0" smtClean="0">
+              <a:solidFill>
+                <a:srgbClr val="FF0000"/>
+              </a:solidFill>
+              <a:latin typeface="+mj-lt"/>
+            </a:endParaRPr>
+          </a:p>
+        </p:txBody>
+      </p:sp>
     </p:spTree>
     <p:extLst>
       <p:ext uri="{BB962C8B-B14F-4D97-AF65-F5344CB8AC3E}">
@@ -10731,6 +10804,51 @@
                       </p:childTnLst>
                     </p:cTn>
                   </p:par>
+                  <p:par>
+                    <p:cTn id="29" fill="hold">
+                      <p:stCondLst>
+                        <p:cond delay="indefinite"/>
+                      </p:stCondLst>
+                      <p:childTnLst>
+                        <p:par>
+                          <p:cTn id="30" fill="hold">
+                            <p:stCondLst>
+                              <p:cond delay="0"/>
+                            </p:stCondLst>
+                            <p:childTnLst>
+                              <p:par>
+                                <p:cTn id="31" presetID="1" presetClass="entr" presetSubtype="0" fill="hold" grpId="0" nodeType="clickEffect">
+                                  <p:stCondLst>
+                                    <p:cond delay="0"/>
+                                  </p:stCondLst>
+                                  <p:childTnLst>
+                                    <p:set>
+                                      <p:cBhvr>
+                                        <p:cTn id="32" dur="1" fill="hold">
+                                          <p:stCondLst>
+                                            <p:cond delay="0"/>
+                                          </p:stCondLst>
+                                        </p:cTn>
+                                        <p:tgtEl>
+                                          <p:spTgt spid="4"/>
+                                        </p:tgtEl>
+                                        <p:attrNameLst>
+                                          <p:attrName>style.visibility</p:attrName>
+                                        </p:attrNameLst>
+                                      </p:cBhvr>
+                                      <p:to>
+                                        <p:strVal val="visible"/>
+                                      </p:to>
+                                    </p:set>
+                                  </p:childTnLst>
+                                </p:cTn>
+                              </p:par>
+                            </p:childTnLst>
+                          </p:cTn>
+                        </p:par>
+                      </p:childTnLst>
+                    </p:cTn>
+                  </p:par>
                 </p:childTnLst>
               </p:cTn>
               <p:prevCondLst>
@@ -10752,6 +10870,9 @@
         </p:cTn>
       </p:par>
     </p:tnLst>
+    <p:bldLst>
+      <p:bldP spid="4" grpId="0" animBg="1"/>
+    </p:bldLst>
   </p:timing>
 </p:sld>
 </file>
@@ -11833,28 +11954,15 @@
           <a:p>
             <a:r>
               <a:rPr lang="en-US" dirty="0" smtClean="0"/>
-              <a:t>Teaming </a:t>
-            </a:r>
-            <a:r>
-              <a:rPr lang="en-US" dirty="0" smtClean="0"/>
-              <a:t>has already started </a:t>
-            </a:r>
-            <a:r>
-              <a:rPr lang="en-US" dirty="0" smtClean="0"/>
-              <a:t>before the quarter through Piazza</a:t>
+              <a:t>Teaming has already started before the quarter through Piazza</a:t>
             </a:r>
           </a:p>
           <a:p>
             <a:pPr lvl="1"/>
             <a:r>
               <a:rPr lang="en-US" dirty="0" smtClean="0"/>
-              <a:t>We’ll allocate sometime for teaming up in </a:t>
-            </a:r>
-            <a:r>
-              <a:rPr lang="en-US" dirty="0" smtClean="0"/>
-              <a:t>this lecture</a:t>
-            </a:r>
-            <a:endParaRPr lang="en-US" dirty="0" smtClean="0"/>
+              <a:t>We’ll allocate sometime for teaming up in this lecture</a:t>
+            </a:r>
           </a:p>
           <a:p>
             <a:r>
@@ -11875,11 +11983,7 @@
             <a:pPr lvl="1"/>
             <a:r>
               <a:rPr lang="en-US" dirty="0" smtClean="0"/>
-              <a:t>We recommend that you include team members of different background to complement each </a:t>
-            </a:r>
-            <a:r>
-              <a:rPr lang="en-US" dirty="0" smtClean="0"/>
-              <a:t>other</a:t>
+              <a:t>We recommend that you include team members of different background to complement each other</a:t>
             </a:r>
           </a:p>
           <a:p>
@@ -11888,7 +11992,6 @@
               <a:rPr lang="en-US" dirty="0" smtClean="0"/>
               <a:t>We need one student from each team to take up the responsibility of ordering supplies for your team</a:t>
             </a:r>
-            <a:endParaRPr lang="en-US" dirty="0" smtClean="0"/>
           </a:p>
           <a:p>
             <a:r>
@@ -11973,11 +12076,7 @@
           <a:p>
             <a:r>
               <a:rPr lang="en-US" dirty="0" smtClean="0"/>
-              <a:t>Quarter 1 – Assembly of </a:t>
-            </a:r>
-            <a:r>
-              <a:rPr lang="en-US" dirty="0" smtClean="0"/>
-              <a:t>a simple Radar</a:t>
+              <a:t>Quarter 1 – Assembly of a simple Radar</a:t>
             </a:r>
             <a:endParaRPr lang="en-US" dirty="0"/>
           </a:p>

</xml_diff>

<commit_message>
update lab manual and appendix
</commit_message>
<xml_diff>
--- a/lectures/lec0/Lec0-CourseMechanisms.pptx
+++ b/lectures/lec0/Lec0-CourseMechanisms.pptx
@@ -314,7 +314,7 @@
             <a:fld id="{F33530C9-BF13-40EE-A1EC-EBBB0134EBBA}" type="datetime1">
               <a:rPr lang="en-US"/>
               <a:pPr/>
-              <a:t>9/21/2015 Monday</a:t>
+              <a:t>9/21/2015</a:t>
             </a:fld>
             <a:endParaRPr lang="en-US"/>
           </a:p>
@@ -532,7 +532,7 @@
             <a:fld id="{7DD20F8F-B3A0-465C-A2C5-4272F8BE0711}" type="datetime1">
               <a:rPr lang="en-US"/>
               <a:pPr/>
-              <a:t>9/21/2015 Monday</a:t>
+              <a:t>9/21/2015</a:t>
             </a:fld>
             <a:endParaRPr lang="en-US"/>
           </a:p>
@@ -931,7 +931,7 @@
             <a:fld id="{7DD20F8F-B3A0-465C-A2C5-4272F8BE0711}" type="datetime1">
               <a:rPr lang="en-US" smtClean="0"/>
               <a:pPr/>
-              <a:t>9/21/2015 Monday</a:t>
+              <a:t>9/21/2015</a:t>
             </a:fld>
             <a:endParaRPr lang="en-US"/>
           </a:p>
@@ -1042,7 +1042,7 @@
             <a:fld id="{7DD20F8F-B3A0-465C-A2C5-4272F8BE0711}" type="datetime1">
               <a:rPr lang="en-US" smtClean="0"/>
               <a:pPr/>
-              <a:t>9/21/2015 Monday</a:t>
+              <a:t>9/21/2015</a:t>
             </a:fld>
             <a:endParaRPr lang="en-US"/>
           </a:p>
@@ -1155,7 +1155,7 @@
             <a:fld id="{7DD20F8F-B3A0-465C-A2C5-4272F8BE0711}" type="datetime1">
               <a:rPr lang="en-US" smtClean="0"/>
               <a:pPr/>
-              <a:t>9/21/2015 Monday</a:t>
+              <a:t>9/21/2015</a:t>
             </a:fld>
             <a:endParaRPr lang="en-US"/>
           </a:p>
@@ -5970,22 +5970,14 @@
           <a:p>
             <a:r>
               <a:rPr lang="en-US" dirty="0" smtClean="0"/>
-              <a:t>Quarter 2 – </a:t>
-            </a:r>
-            <a:r>
-              <a:rPr lang="en-US" dirty="0" smtClean="0"/>
-              <a:t>Option 1: Performance </a:t>
-            </a:r>
-            <a:r>
-              <a:rPr lang="en-US" dirty="0" smtClean="0"/>
-              <a:t>Competition</a:t>
+              <a:t>Quarter 2 – Option 1: Performance Competition</a:t>
             </a:r>
             <a:endParaRPr lang="en-US" dirty="0"/>
           </a:p>
         </p:txBody>
       </p:sp>
-      <mc:AlternateContent xmlns:mc="http://schemas.openxmlformats.org/markup-compatibility/2006">
-        <mc:Choice xmlns:a14="http://schemas.microsoft.com/office/drawing/2010/main" Requires="a14">
+      <mc:AlternateContent xmlns:mc="http://schemas.openxmlformats.org/markup-compatibility/2006" xmlns:a14="http://schemas.microsoft.com/office/drawing/2010/main">
+        <mc:Choice Requires="a14">
           <p:sp>
             <p:nvSpPr>
               <p:cNvPr id="3" name="Text Placeholder 2"/>
@@ -6003,11 +5995,7 @@
               <a:p>
                 <a:r>
                   <a:rPr lang="en-US" dirty="0" smtClean="0"/>
-                  <a:t>Competition: measure </a:t>
-                </a:r>
-                <a:r>
-                  <a:rPr lang="en-US" dirty="0" smtClean="0"/>
-                  <a:t>the distance of </a:t>
+                  <a:t>Competition: measure the distance of </a:t>
                 </a:r>
                 <a:r>
                   <a:rPr lang="en-US" i="1" dirty="0" smtClean="0"/>
@@ -6023,22 +6011,30 @@
                 <a14:m>
                   <m:oMath xmlns:m="http://schemas.openxmlformats.org/officeDocument/2006/math">
                     <m:r>
-                      <a:rPr lang="en-US"/>
+                      <a:rPr lang="en-US">
+                        <a:latin typeface="Cambria Math" panose="02040503050406030204" pitchFamily="18" charset="0"/>
+                      </a:rPr>
                       <m:t>𝑠𝑐𝑜𝑟𝑒</m:t>
                     </m:r>
                     <m:r>
-                      <a:rPr lang="en-US"/>
+                      <a:rPr lang="en-US">
+                        <a:latin typeface="Cambria Math" panose="02040503050406030204" pitchFamily="18" charset="0"/>
+                      </a:rPr>
                       <m:t>=</m:t>
                     </m:r>
                     <m:r>
-                      <a:rPr lang="en-US"/>
+                      <a:rPr lang="en-US">
+                        <a:latin typeface="Cambria Math" panose="02040503050406030204" pitchFamily="18" charset="0"/>
+                      </a:rPr>
                       <m:t>𝑊𝑃</m:t>
                     </m:r>
                     <m:nary>
                       <m:naryPr>
                         <m:chr m:val="∏"/>
                         <m:ctrlPr>
-                          <a:rPr lang="en-US"/>
+                          <a:rPr lang="en-US" i="1">
+                            <a:latin typeface="Cambria Math" panose="02040503050406030204" pitchFamily="18" charset="0"/>
+                          </a:rPr>
                         </m:ctrlPr>
                       </m:naryPr>
                       <m:sub>
@@ -6046,17 +6042,23 @@
                           <m:rPr>
                             <m:brk m:alnAt="23"/>
                           </m:rPr>
-                          <a:rPr lang="en-US"/>
+                          <a:rPr lang="en-US">
+                            <a:latin typeface="Cambria Math" panose="02040503050406030204" pitchFamily="18" charset="0"/>
+                          </a:rPr>
                           <m:t>𝑖</m:t>
                         </m:r>
                         <m:r>
-                          <a:rPr lang="en-US"/>
+                          <a:rPr lang="en-US">
+                            <a:latin typeface="Cambria Math" panose="02040503050406030204" pitchFamily="18" charset="0"/>
+                          </a:rPr>
                           <m:t>=1</m:t>
                         </m:r>
                       </m:sub>
                       <m:sup>
                         <m:r>
-                          <a:rPr lang="en-US"/>
+                          <a:rPr lang="en-US">
+                            <a:latin typeface="Cambria Math" panose="02040503050406030204" pitchFamily="18" charset="0"/>
+                          </a:rPr>
                           <m:t>𝑁</m:t>
                         </m:r>
                       </m:sup>
@@ -6064,21 +6066,27 @@
                         <m:d>
                           <m:dPr>
                             <m:ctrlPr>
-                              <a:rPr lang="en-US"/>
+                              <a:rPr lang="en-US" i="1">
+                                <a:latin typeface="Cambria Math" panose="02040503050406030204" pitchFamily="18" charset="0"/>
+                              </a:rPr>
                             </m:ctrlPr>
                           </m:dPr>
                           <m:e>
                             <m:f>
                               <m:fPr>
                                 <m:ctrlPr>
-                                  <a:rPr lang="en-US"/>
+                                  <a:rPr lang="en-US" i="1">
+                                    <a:latin typeface="Cambria Math" panose="02040503050406030204" pitchFamily="18" charset="0"/>
+                                  </a:rPr>
                                 </m:ctrlPr>
                               </m:fPr>
                               <m:num>
                                 <m:sSub>
                                   <m:sSubPr>
                                     <m:ctrlPr>
-                                      <a:rPr lang="en-US"/>
+                                      <a:rPr lang="en-US" i="1">
+                                        <a:latin typeface="Cambria Math" panose="02040503050406030204" pitchFamily="18" charset="0"/>
+                                      </a:rPr>
                                     </m:ctrlPr>
                                   </m:sSubPr>
                                   <m:e>
@@ -6086,12 +6094,16 @@
                                       <m:accPr>
                                         <m:chr m:val="̂"/>
                                         <m:ctrlPr>
-                                          <a:rPr lang="en-US"/>
+                                          <a:rPr lang="en-US" i="1">
+                                            <a:latin typeface="Cambria Math" panose="02040503050406030204" pitchFamily="18" charset="0"/>
+                                          </a:rPr>
                                         </m:ctrlPr>
                                       </m:accPr>
                                       <m:e>
                                         <m:r>
-                                          <a:rPr lang="en-US"/>
+                                          <a:rPr lang="en-US">
+                                            <a:latin typeface="Cambria Math" panose="02040503050406030204" pitchFamily="18" charset="0"/>
+                                          </a:rPr>
                                           <m:t>𝐿</m:t>
                                         </m:r>
                                       </m:e>
@@ -6099,30 +6111,40 @@
                                   </m:e>
                                   <m:sub>
                                     <m:r>
-                                      <a:rPr lang="en-US"/>
+                                      <a:rPr lang="en-US">
+                                        <a:latin typeface="Cambria Math" panose="02040503050406030204" pitchFamily="18" charset="0"/>
+                                      </a:rPr>
                                       <m:t>𝑖</m:t>
                                     </m:r>
                                   </m:sub>
                                 </m:sSub>
                                 <m:r>
-                                  <a:rPr lang="en-US"/>
+                                  <a:rPr lang="en-US">
+                                    <a:latin typeface="Cambria Math" panose="02040503050406030204" pitchFamily="18" charset="0"/>
+                                  </a:rPr>
                                   <m:t>−</m:t>
                                 </m:r>
                                 <m:sSub>
                                   <m:sSubPr>
                                     <m:ctrlPr>
-                                      <a:rPr lang="en-US"/>
+                                      <a:rPr lang="en-US" i="1">
+                                        <a:latin typeface="Cambria Math" panose="02040503050406030204" pitchFamily="18" charset="0"/>
+                                      </a:rPr>
                                     </m:ctrlPr>
                                   </m:sSubPr>
                                   <m:e>
                                     <m:r>
-                                      <a:rPr lang="en-US"/>
+                                      <a:rPr lang="en-US">
+                                        <a:latin typeface="Cambria Math" panose="02040503050406030204" pitchFamily="18" charset="0"/>
+                                      </a:rPr>
                                       <m:t>𝐿</m:t>
                                     </m:r>
                                   </m:e>
                                   <m:sub>
                                     <m:r>
-                                      <a:rPr lang="en-US"/>
+                                      <a:rPr lang="en-US">
+                                        <a:latin typeface="Cambria Math" panose="02040503050406030204" pitchFamily="18" charset="0"/>
+                                      </a:rPr>
                                       <m:t>𝑖</m:t>
                                     </m:r>
                                   </m:sub>
@@ -6132,18 +6154,24 @@
                                 <m:sSub>
                                   <m:sSubPr>
                                     <m:ctrlPr>
-                                      <a:rPr lang="en-US"/>
+                                      <a:rPr lang="en-US" i="1">
+                                        <a:latin typeface="Cambria Math" panose="02040503050406030204" pitchFamily="18" charset="0"/>
+                                      </a:rPr>
                                     </m:ctrlPr>
                                   </m:sSubPr>
                                   <m:e>
                                     <m:r>
-                                      <a:rPr lang="en-US"/>
+                                      <a:rPr lang="en-US">
+                                        <a:latin typeface="Cambria Math" panose="02040503050406030204" pitchFamily="18" charset="0"/>
+                                      </a:rPr>
                                       <m:t>𝐿</m:t>
                                     </m:r>
                                   </m:e>
                                   <m:sub>
                                     <m:r>
-                                      <a:rPr lang="en-US"/>
+                                      <a:rPr lang="en-US">
+                                        <a:latin typeface="Cambria Math" panose="02040503050406030204" pitchFamily="18" charset="0"/>
+                                      </a:rPr>
                                       <m:t>𝑖</m:t>
                                     </m:r>
                                   </m:sub>
@@ -6165,7 +6193,9 @@
                     <m:sSub>
                       <m:sSubPr>
                         <m:ctrlPr>
-                          <a:rPr lang="en-US"/>
+                          <a:rPr lang="en-US" i="1">
+                            <a:latin typeface="Cambria Math" panose="02040503050406030204" pitchFamily="18" charset="0"/>
+                          </a:rPr>
                         </m:ctrlPr>
                       </m:sSubPr>
                       <m:e>
@@ -6173,12 +6203,16 @@
                           <m:accPr>
                             <m:chr m:val="̂"/>
                             <m:ctrlPr>
-                              <a:rPr lang="en-US"/>
+                              <a:rPr lang="en-US" i="1">
+                                <a:latin typeface="Cambria Math" panose="02040503050406030204" pitchFamily="18" charset="0"/>
+                              </a:rPr>
                             </m:ctrlPr>
                           </m:accPr>
                           <m:e>
                             <m:r>
-                              <a:rPr lang="en-US"/>
+                              <a:rPr lang="en-US">
+                                <a:latin typeface="Cambria Math" panose="02040503050406030204" pitchFamily="18" charset="0"/>
+                              </a:rPr>
                               <m:t>𝐿</m:t>
                             </m:r>
                           </m:e>
@@ -6186,7 +6220,9 @@
                       </m:e>
                       <m:sub>
                         <m:r>
-                          <a:rPr lang="en-US"/>
+                          <a:rPr lang="en-US">
+                            <a:latin typeface="Cambria Math" panose="02040503050406030204" pitchFamily="18" charset="0"/>
+                          </a:rPr>
                           <m:t>𝑖</m:t>
                         </m:r>
                       </m:sub>
@@ -6213,18 +6249,24 @@
                     <m:sSub>
                       <m:sSubPr>
                         <m:ctrlPr>
-                          <a:rPr lang="en-US"/>
+                          <a:rPr lang="en-US" i="1">
+                            <a:latin typeface="Cambria Math" panose="02040503050406030204" pitchFamily="18" charset="0"/>
+                          </a:rPr>
                         </m:ctrlPr>
                       </m:sSubPr>
                       <m:e>
                         <m:r>
-                          <a:rPr lang="en-US"/>
+                          <a:rPr lang="en-US">
+                            <a:latin typeface="Cambria Math" panose="02040503050406030204" pitchFamily="18" charset="0"/>
+                          </a:rPr>
                           <m:t>𝐿</m:t>
                         </m:r>
                       </m:e>
                       <m:sub>
                         <m:r>
-                          <a:rPr lang="en-US"/>
+                          <a:rPr lang="en-US">
+                            <a:latin typeface="Cambria Math" panose="02040503050406030204" pitchFamily="18" charset="0"/>
+                          </a:rPr>
                           <m:t>𝑖</m:t>
                         </m:r>
                       </m:sub>
@@ -6233,15 +6275,7 @@
                 </a14:m>
                 <a:r>
                   <a:rPr lang="en-US" dirty="0"/>
-                  <a:t> is </a:t>
-                </a:r>
-                <a:r>
-                  <a:rPr lang="en-US" dirty="0"/>
-                  <a:t>the actual </a:t>
-                </a:r>
-                <a:r>
-                  <a:rPr lang="en-US" dirty="0"/>
-                  <a:t>distance to the </a:t>
+                  <a:t> is the actual distance to the </a:t>
                 </a:r>
                 <a:r>
                   <a:rPr lang="en-US" dirty="0" err="1"/>
@@ -6249,11 +6283,7 @@
                 </a:r>
                 <a:r>
                   <a:rPr lang="en-US" dirty="0"/>
-                  <a:t> </a:t>
-                </a:r>
-                <a:r>
-                  <a:rPr lang="en-US" dirty="0"/>
-                  <a:t>target</a:t>
+                  <a:t> target</a:t>
                 </a:r>
               </a:p>
               <a:p>
@@ -6261,22 +6291,16 @@
                 <a14:m>
                   <m:oMath xmlns:m="http://schemas.openxmlformats.org/officeDocument/2006/math">
                     <m:r>
-                      <a:rPr lang="en-US"/>
+                      <a:rPr lang="en-US">
+                        <a:latin typeface="Cambria Math" panose="02040503050406030204" pitchFamily="18" charset="0"/>
+                      </a:rPr>
                       <m:t>𝑊</m:t>
                     </m:r>
                   </m:oMath>
                 </a14:m>
                 <a:r>
                   <a:rPr lang="en-US" dirty="0"/>
-                  <a:t> is </a:t>
-                </a:r>
-                <a:r>
-                  <a:rPr lang="en-US" dirty="0"/>
-                  <a:t>the </a:t>
-                </a:r>
-                <a:r>
-                  <a:rPr lang="en-US" dirty="0"/>
-                  <a:t>weight of the radar system, including radar, processing unit</a:t>
+                  <a:t> is the weight of the radar system, including radar, processing unit</a:t>
                 </a:r>
               </a:p>
               <a:p>
@@ -6286,12 +6310,16 @@
                     <m:sSup>
                       <m:sSupPr>
                         <m:ctrlPr>
-                          <a:rPr lang="en-US"/>
+                          <a:rPr lang="en-US" i="1">
+                            <a:latin typeface="Cambria Math" panose="02040503050406030204" pitchFamily="18" charset="0"/>
+                          </a:rPr>
                         </m:ctrlPr>
                       </m:sSupPr>
                       <m:e>
                         <m:r>
-                          <a:rPr lang="en-US"/>
+                          <a:rPr lang="en-US">
+                            <a:latin typeface="Cambria Math" panose="02040503050406030204" pitchFamily="18" charset="0"/>
+                          </a:rPr>
                           <m:t>𝑃</m:t>
                         </m:r>
                       </m:e>
@@ -6321,7 +6349,7 @@
             </p:txBody>
           </p:sp>
         </mc:Choice>
-        <mc:Fallback>
+        <mc:Fallback xmlns="">
           <p:sp>
             <p:nvSpPr>
               <p:cNvPr id="3" name="Text Placeholder 2"/>
@@ -10924,7 +10952,11 @@
             </a:r>
             <a:r>
               <a:rPr lang="en-US" b="1" dirty="0" smtClean="0"/>
-              <a:t>10 AM – 12 PM Monday </a:t>
+              <a:t>10 AM – 12 PM </a:t>
+            </a:r>
+            <a:r>
+              <a:rPr lang="en-US" b="1" dirty="0" smtClean="0"/>
+              <a:t>Tuesday </a:t>
             </a:r>
             <a:r>
               <a:rPr lang="en-US" dirty="0" smtClean="0"/>
@@ -12619,7 +12651,22 @@
             </a:pPr>
             <a:r>
               <a:rPr lang="en-US" dirty="0" smtClean="0"/>
-              <a:t>Deliverables:</a:t>
+              <a:t>(Optional) Radar system design for small UAVs</a:t>
+            </a:r>
+          </a:p>
+          <a:p>
+            <a:pPr lvl="1">
+              <a:lnSpc>
+                <a:spcPct val="114000"/>
+              </a:lnSpc>
+            </a:pPr>
+            <a:r>
+              <a:rPr lang="en-US" dirty="0" smtClean="0"/>
+              <a:t>Deliverables</a:t>
+            </a:r>
+            <a:r>
+              <a:rPr lang="en-US" dirty="0" smtClean="0"/>
+              <a:t>:</a:t>
             </a:r>
           </a:p>
           <a:p>

</xml_diff>

<commit_message>
update checklist and lec0
</commit_message>
<xml_diff>
--- a/lectures/lec0/Lec0-CourseMechanisms.pptx
+++ b/lectures/lec0/Lec0-CourseMechanisms.pptx
@@ -21,7 +21,7 @@
     <p:sldId id="319" r:id="rId9"/>
     <p:sldId id="326" r:id="rId10"/>
     <p:sldId id="317" r:id="rId11"/>
-    <p:sldId id="320" r:id="rId12"/>
+    <p:sldId id="328" r:id="rId12"/>
     <p:sldId id="321" r:id="rId13"/>
     <p:sldId id="325" r:id="rId14"/>
     <p:sldId id="327" r:id="rId15"/>
@@ -314,7 +314,7 @@
             <a:fld id="{F33530C9-BF13-40EE-A1EC-EBBB0134EBBA}" type="datetime1">
               <a:rPr lang="en-US"/>
               <a:pPr/>
-              <a:t>9/21/2015</a:t>
+              <a:t>9/24/2015 Thursday</a:t>
             </a:fld>
             <a:endParaRPr lang="en-US"/>
           </a:p>
@@ -532,7 +532,7 @@
             <a:fld id="{7DD20F8F-B3A0-465C-A2C5-4272F8BE0711}" type="datetime1">
               <a:rPr lang="en-US"/>
               <a:pPr/>
-              <a:t>9/21/2015</a:t>
+              <a:t>9/24/2015 Thursday</a:t>
             </a:fld>
             <a:endParaRPr lang="en-US"/>
           </a:p>
@@ -931,7 +931,7 @@
             <a:fld id="{7DD20F8F-B3A0-465C-A2C5-4272F8BE0711}" type="datetime1">
               <a:rPr lang="en-US" smtClean="0"/>
               <a:pPr/>
-              <a:t>9/21/2015</a:t>
+              <a:t>9/24/2015 Thursday</a:t>
             </a:fld>
             <a:endParaRPr lang="en-US"/>
           </a:p>
@@ -1042,7 +1042,7 @@
             <a:fld id="{7DD20F8F-B3A0-465C-A2C5-4272F8BE0711}" type="datetime1">
               <a:rPr lang="en-US" smtClean="0"/>
               <a:pPr/>
-              <a:t>9/21/2015</a:t>
+              <a:t>9/24/2015 Thursday</a:t>
             </a:fld>
             <a:endParaRPr lang="en-US"/>
           </a:p>
@@ -1155,7 +1155,7 @@
             <a:fld id="{7DD20F8F-B3A0-465C-A2C5-4272F8BE0711}" type="datetime1">
               <a:rPr lang="en-US" smtClean="0"/>
               <a:pPr/>
-              <a:t>9/21/2015</a:t>
+              <a:t>9/24/2015 Thursday</a:t>
             </a:fld>
             <a:endParaRPr lang="en-US"/>
           </a:p>
@@ -5555,7 +5555,7 @@
     </p:spTree>
     <p:extLst>
       <p:ext uri="{BB962C8B-B14F-4D97-AF65-F5344CB8AC3E}">
-        <p14:creationId xmlns:p14="http://schemas.microsoft.com/office/powerpoint/2010/main" val="3199399485"/>
+        <p14:creationId xmlns:p14="http://schemas.microsoft.com/office/powerpoint/2010/main" val="2242939269"/>
       </p:ext>
     </p:extLst>
   </p:cSld>
@@ -10952,11 +10952,7 @@
             </a:r>
             <a:r>
               <a:rPr lang="en-US" b="1" dirty="0" smtClean="0"/>
-              <a:t>10 AM – 12 PM </a:t>
-            </a:r>
-            <a:r>
-              <a:rPr lang="en-US" b="1" dirty="0" smtClean="0"/>
-              <a:t>Tuesday </a:t>
+              <a:t>10 AM – 12 PM Tuesday </a:t>
             </a:r>
             <a:r>
               <a:rPr lang="en-US" dirty="0" smtClean="0"/>
@@ -12662,11 +12658,7 @@
             </a:pPr>
             <a:r>
               <a:rPr lang="en-US" dirty="0" smtClean="0"/>
-              <a:t>Deliverables</a:t>
-            </a:r>
-            <a:r>
-              <a:rPr lang="en-US" dirty="0" smtClean="0"/>
-              <a:t>:</a:t>
+              <a:t>Deliverables:</a:t>
             </a:r>
           </a:p>
           <a:p>
@@ -13458,6 +13450,24 @@
             <a:r>
               <a:rPr lang="en-US" dirty="0" smtClean="0"/>
               <a:t>In the first lab, you need to sign a form acknowledging that your group received the toolbox with all its contents</a:t>
+            </a:r>
+          </a:p>
+          <a:p>
+            <a:pPr lvl="1"/>
+            <a:r>
+              <a:rPr lang="en-US" dirty="0" smtClean="0"/>
+              <a:t>The </a:t>
+            </a:r>
+            <a:r>
+              <a:rPr lang="en-US" dirty="0"/>
+              <a:t>toolbox and the components must be returned to the TA by the end of the Winter quarter before grades can be assigned</a:t>
+            </a:r>
+          </a:p>
+          <a:p>
+            <a:pPr lvl="1"/>
+            <a:r>
+              <a:rPr lang="en-US" dirty="0"/>
+              <a:t>Your group must be responsible for replacing broken or lost items</a:t>
             </a:r>
           </a:p>
           <a:p>

</xml_diff>